<commit_message>
Updated presentation with paper link
</commit_message>
<xml_diff>
--- a/Presentation/GIDS_2020.pptx
+++ b/Presentation/GIDS_2020.pptx
@@ -217,7 +217,7 @@
           <a:p>
             <a:fld id="{7E1AFF99-4152-4F27-A9C2-040B57B9D2AD}" type="datetimeFigureOut">
               <a:rPr lang="en-IN" smtClean="0"/>
-              <a:t>01-12-2020</a:t>
+              <a:t>07-12-2020</a:t>
             </a:fld>
             <a:endParaRPr lang="en-IN"/>
           </a:p>
@@ -833,6 +833,121 @@
 </p:notes>
 </file>
 
+<file path=ppt/notesSlides/notesSlide3.xml><?xml version="1.0" encoding="utf-8"?>
+<p:notes xmlns:a="http://schemas.openxmlformats.org/drawingml/2006/main" xmlns:r="http://schemas.openxmlformats.org/officeDocument/2006/relationships" xmlns:p="http://schemas.openxmlformats.org/presentationml/2006/main">
+  <p:cSld>
+    <p:spTree>
+      <p:nvGrpSpPr>
+        <p:cNvPr id="1" name=""/>
+        <p:cNvGrpSpPr/>
+        <p:nvPr/>
+      </p:nvGrpSpPr>
+      <p:grpSpPr>
+        <a:xfrm>
+          <a:off x="0" y="0"/>
+          <a:ext cx="0" cy="0"/>
+          <a:chOff x="0" y="0"/>
+          <a:chExt cx="0" cy="0"/>
+        </a:xfrm>
+      </p:grpSpPr>
+      <p:sp>
+        <p:nvSpPr>
+          <p:cNvPr id="2" name="Slide Image Placeholder 1"/>
+          <p:cNvSpPr>
+            <a:spLocks noGrp="1" noRot="1" noChangeAspect="1"/>
+          </p:cNvSpPr>
+          <p:nvPr>
+            <p:ph type="sldImg"/>
+          </p:nvPr>
+        </p:nvSpPr>
+        <p:spPr/>
+      </p:sp>
+      <p:sp>
+        <p:nvSpPr>
+          <p:cNvPr id="3" name="Notes Placeholder 2"/>
+          <p:cNvSpPr>
+            <a:spLocks noGrp="1"/>
+          </p:cNvSpPr>
+          <p:nvPr>
+            <p:ph type="body" idx="1"/>
+          </p:nvPr>
+        </p:nvSpPr>
+        <p:spPr/>
+        <p:txBody>
+          <a:bodyPr/>
+          <a:lstStyle/>
+          <a:p>
+            <a:pPr marL="0" marR="0" lvl="0" indent="0" algn="l" defTabSz="914400" rtl="0" eaLnBrk="1" fontAlgn="auto" latinLnBrk="0" hangingPunct="1">
+              <a:lnSpc>
+                <a:spcPct val="100000"/>
+              </a:lnSpc>
+              <a:spcBef>
+                <a:spcPts val="0"/>
+              </a:spcBef>
+              <a:spcAft>
+                <a:spcPts val="0"/>
+              </a:spcAft>
+              <a:buClrTx/>
+              <a:buSzTx/>
+              <a:buFontTx/>
+              <a:buNone/>
+              <a:tabLst/>
+              <a:defRPr/>
+            </a:pPr>
+            <a:r>
+              <a:rPr lang="en-IN" dirty="0"/>
+              <a:t>Code reference </a:t>
+            </a:r>
+            <a:r>
+              <a:rPr lang="en-IN"/>
+              <a:t>- https</a:t>
+            </a:r>
+            <a:r>
+              <a:rPr lang="en-IN" dirty="0"/>
+              <a:t>://github.com/adib0073/NUMODRIL</a:t>
+            </a:r>
+          </a:p>
+          <a:p>
+            <a:endParaRPr lang="en-IN" dirty="0"/>
+          </a:p>
+        </p:txBody>
+      </p:sp>
+      <p:sp>
+        <p:nvSpPr>
+          <p:cNvPr id="4" name="Slide Number Placeholder 3"/>
+          <p:cNvSpPr>
+            <a:spLocks noGrp="1"/>
+          </p:cNvSpPr>
+          <p:nvPr>
+            <p:ph type="sldNum" sz="quarter" idx="5"/>
+          </p:nvPr>
+        </p:nvSpPr>
+        <p:spPr/>
+        <p:txBody>
+          <a:bodyPr/>
+          <a:lstStyle/>
+          <a:p>
+            <a:fld id="{C899F86E-8B1A-4382-AC3A-E34908A7E2E5}" type="slidenum">
+              <a:rPr lang="en-IN" smtClean="0"/>
+              <a:t>15</a:t>
+            </a:fld>
+            <a:endParaRPr lang="en-IN"/>
+          </a:p>
+        </p:txBody>
+      </p:sp>
+    </p:spTree>
+    <p:extLst>
+      <p:ext uri="{BB962C8B-B14F-4D97-AF65-F5344CB8AC3E}">
+        <p14:creationId xmlns:p14="http://schemas.microsoft.com/office/powerpoint/2010/main" val="3576056809"/>
+      </p:ext>
+    </p:extLst>
+  </p:cSld>
+  <p:clrMapOvr>
+    <a:masterClrMapping/>
+  </p:clrMapOvr>
+</p:notes>
+</file>
+
 <file path=ppt/slideLayouts/slideLayout1.xml><?xml version="1.0" encoding="utf-8"?>
 <p:sldLayout xmlns:a="http://schemas.openxmlformats.org/drawingml/2006/main" xmlns:r="http://schemas.openxmlformats.org/officeDocument/2006/relationships" xmlns:p="http://schemas.openxmlformats.org/presentationml/2006/main" showMasterSp="0" type="title" preserve="1">
   <p:cSld name="Title Slide">
@@ -1335,7 +1450,7 @@
           <a:p>
             <a:fld id="{63FAC24E-231B-4354-B3DE-23FA61685C81}" type="datetimeFigureOut">
               <a:rPr lang="en-IN" smtClean="0"/>
-              <a:t>01-12-2020</a:t>
+              <a:t>07-12-2020</a:t>
             </a:fld>
             <a:endParaRPr lang="en-IN"/>
           </a:p>
@@ -1631,7 +1746,7 @@
           <a:p>
             <a:fld id="{63FAC24E-231B-4354-B3DE-23FA61685C81}" type="datetimeFigureOut">
               <a:rPr lang="en-IN" smtClean="0"/>
-              <a:t>01-12-2020</a:t>
+              <a:t>07-12-2020</a:t>
             </a:fld>
             <a:endParaRPr lang="en-IN"/>
           </a:p>
@@ -1879,7 +1994,7 @@
           <a:p>
             <a:fld id="{63FAC24E-231B-4354-B3DE-23FA61685C81}" type="datetimeFigureOut">
               <a:rPr lang="en-IN" smtClean="0"/>
-              <a:t>01-12-2020</a:t>
+              <a:t>07-12-2020</a:t>
             </a:fld>
             <a:endParaRPr lang="en-IN"/>
           </a:p>
@@ -2419,7 +2534,7 @@
           <a:p>
             <a:fld id="{63FAC24E-231B-4354-B3DE-23FA61685C81}" type="datetimeFigureOut">
               <a:rPr lang="en-IN" smtClean="0"/>
-              <a:t>01-12-2020</a:t>
+              <a:t>07-12-2020</a:t>
             </a:fld>
             <a:endParaRPr lang="en-IN"/>
           </a:p>
@@ -2667,7 +2782,7 @@
           <a:p>
             <a:fld id="{63FAC24E-231B-4354-B3DE-23FA61685C81}" type="datetimeFigureOut">
               <a:rPr lang="en-IN" smtClean="0"/>
-              <a:t>01-12-2020</a:t>
+              <a:t>07-12-2020</a:t>
             </a:fld>
             <a:endParaRPr lang="en-IN"/>
           </a:p>
@@ -3199,7 +3314,7 @@
           <a:p>
             <a:fld id="{63FAC24E-231B-4354-B3DE-23FA61685C81}" type="datetimeFigureOut">
               <a:rPr lang="en-IN" smtClean="0"/>
-              <a:t>01-12-2020</a:t>
+              <a:t>07-12-2020</a:t>
             </a:fld>
             <a:endParaRPr lang="en-IN"/>
           </a:p>
@@ -3496,7 +3611,7 @@
           <a:p>
             <a:fld id="{63FAC24E-231B-4354-B3DE-23FA61685C81}" type="datetimeFigureOut">
               <a:rPr lang="en-IN" smtClean="0"/>
-              <a:t>01-12-2020</a:t>
+              <a:t>07-12-2020</a:t>
             </a:fld>
             <a:endParaRPr lang="en-IN"/>
           </a:p>
@@ -3670,7 +3785,7 @@
           <a:p>
             <a:fld id="{63FAC24E-231B-4354-B3DE-23FA61685C81}" type="datetimeFigureOut">
               <a:rPr lang="en-IN" smtClean="0"/>
-              <a:t>01-12-2020</a:t>
+              <a:t>07-12-2020</a:t>
             </a:fld>
             <a:endParaRPr lang="en-IN"/>
           </a:p>
@@ -3850,7 +3965,7 @@
           <a:p>
             <a:fld id="{63FAC24E-231B-4354-B3DE-23FA61685C81}" type="datetimeFigureOut">
               <a:rPr lang="en-IN" smtClean="0"/>
-              <a:t>01-12-2020</a:t>
+              <a:t>07-12-2020</a:t>
             </a:fld>
             <a:endParaRPr lang="en-IN"/>
           </a:p>
@@ -4020,7 +4135,7 @@
           <a:p>
             <a:fld id="{63FAC24E-231B-4354-B3DE-23FA61685C81}" type="datetimeFigureOut">
               <a:rPr lang="en-IN" smtClean="0"/>
-              <a:t>01-12-2020</a:t>
+              <a:t>07-12-2020</a:t>
             </a:fld>
             <a:endParaRPr lang="en-IN"/>
           </a:p>
@@ -4271,7 +4386,7 @@
           <a:p>
             <a:fld id="{63FAC24E-231B-4354-B3DE-23FA61685C81}" type="datetimeFigureOut">
               <a:rPr lang="en-IN" smtClean="0"/>
-              <a:t>01-12-2020</a:t>
+              <a:t>07-12-2020</a:t>
             </a:fld>
             <a:endParaRPr lang="en-IN"/>
           </a:p>
@@ -4568,7 +4683,7 @@
           <a:p>
             <a:fld id="{63FAC24E-231B-4354-B3DE-23FA61685C81}" type="datetimeFigureOut">
               <a:rPr lang="en-IN" smtClean="0"/>
-              <a:t>01-12-2020</a:t>
+              <a:t>07-12-2020</a:t>
             </a:fld>
             <a:endParaRPr lang="en-IN"/>
           </a:p>
@@ -5010,7 +5125,7 @@
           <a:p>
             <a:fld id="{63FAC24E-231B-4354-B3DE-23FA61685C81}" type="datetimeFigureOut">
               <a:rPr lang="en-IN" smtClean="0"/>
-              <a:t>01-12-2020</a:t>
+              <a:t>07-12-2020</a:t>
             </a:fld>
             <a:endParaRPr lang="en-IN"/>
           </a:p>
@@ -5128,7 +5243,7 @@
           <a:p>
             <a:fld id="{63FAC24E-231B-4354-B3DE-23FA61685C81}" type="datetimeFigureOut">
               <a:rPr lang="en-IN" smtClean="0"/>
-              <a:t>01-12-2020</a:t>
+              <a:t>07-12-2020</a:t>
             </a:fld>
             <a:endParaRPr lang="en-IN"/>
           </a:p>
@@ -5223,7 +5338,7 @@
           <a:p>
             <a:fld id="{63FAC24E-231B-4354-B3DE-23FA61685C81}" type="datetimeFigureOut">
               <a:rPr lang="en-IN" smtClean="0"/>
-              <a:t>01-12-2020</a:t>
+              <a:t>07-12-2020</a:t>
             </a:fld>
             <a:endParaRPr lang="en-IN"/>
           </a:p>
@@ -5506,7 +5621,7 @@
           <a:p>
             <a:fld id="{63FAC24E-231B-4354-B3DE-23FA61685C81}" type="datetimeFigureOut">
               <a:rPr lang="en-IN" smtClean="0"/>
-              <a:t>01-12-2020</a:t>
+              <a:t>07-12-2020</a:t>
             </a:fld>
             <a:endParaRPr lang="en-IN"/>
           </a:p>
@@ -5797,7 +5912,7 @@
           <a:p>
             <a:fld id="{63FAC24E-231B-4354-B3DE-23FA61685C81}" type="datetimeFigureOut">
               <a:rPr lang="en-IN" smtClean="0"/>
-              <a:t>01-12-2020</a:t>
+              <a:t>07-12-2020</a:t>
             </a:fld>
             <a:endParaRPr lang="en-IN"/>
           </a:p>
@@ -6327,7 +6442,7 @@
           <a:p>
             <a:fld id="{63FAC24E-231B-4354-B3DE-23FA61685C81}" type="datetimeFigureOut">
               <a:rPr lang="en-IN" smtClean="0"/>
-              <a:t>01-12-2020</a:t>
+              <a:t>07-12-2020</a:t>
             </a:fld>
             <a:endParaRPr lang="en-IN"/>
           </a:p>
@@ -7565,7 +7680,7 @@
           <a:p>
             <a:r>
               <a:rPr lang="en-US" dirty="0"/>
-              <a:t>DHL (particularly the ML variant) is faster, more efficient and less computational expensive.</a:t>
+              <a:t>DHL (particularly the ML variant) is faster, more efficient and less computationally expensive.</a:t>
             </a:r>
           </a:p>
           <a:p>
@@ -9472,7 +9587,7 @@
             <a:pPr algn="ctr"/>
             <a:r>
               <a:rPr lang="en-US" dirty="0"/>
-              <a:t>Classical ML Classifier</a:t>
+              <a:t>Classical ML Learner</a:t>
             </a:r>
           </a:p>
         </p:txBody>
@@ -9575,7 +9690,7 @@
             <a:pPr algn="ctr"/>
             <a:r>
               <a:rPr lang="en-US" dirty="0"/>
-              <a:t>ML or DL Classifier</a:t>
+              <a:t>ML or DL Learner</a:t>
             </a:r>
           </a:p>
         </p:txBody>
@@ -11050,6 +11165,51 @@
           </a:solidFill>
         </p:spPr>
       </p:pic>
+      <p:sp>
+        <p:nvSpPr>
+          <p:cNvPr id="18" name="TextBox 17">
+            <a:extLst>
+              <a:ext uri="{FF2B5EF4-FFF2-40B4-BE49-F238E27FC236}">
+                <a16:creationId xmlns:a16="http://schemas.microsoft.com/office/drawing/2014/main" id="{7C6FC517-3752-48A3-89ED-CA1B3117C245}"/>
+              </a:ext>
+            </a:extLst>
+          </p:cNvPr>
+          <p:cNvSpPr txBox="1"/>
+          <p:nvPr/>
+        </p:nvSpPr>
+        <p:spPr>
+          <a:xfrm>
+            <a:off x="382845" y="6223541"/>
+            <a:ext cx="7377693" cy="369332"/>
+          </a:xfrm>
+          <a:prstGeom prst="rect">
+            <a:avLst/>
+          </a:prstGeom>
+          <a:noFill/>
+        </p:spPr>
+        <p:txBody>
+          <a:bodyPr wrap="square">
+            <a:spAutoFit/>
+          </a:bodyPr>
+          <a:lstStyle/>
+          <a:p>
+            <a:r>
+              <a:rPr lang="en-IN" b="1" dirty="0"/>
+              <a:t>Link - </a:t>
+            </a:r>
+            <a:r>
+              <a:rPr lang="en-IN" b="1" dirty="0">
+                <a:hlinkClick r:id="rId4"/>
+              </a:rPr>
+              <a:t>https://www.biorxiv.org/content/10.1101/2020.11.23.393660v1</a:t>
+            </a:r>
+            <a:r>
+              <a:rPr lang="en-IN" b="1" dirty="0"/>
+              <a:t> </a:t>
+            </a:r>
+          </a:p>
+        </p:txBody>
+      </p:sp>
     </p:spTree>
     <p:extLst>
       <p:ext uri="{BB962C8B-B14F-4D97-AF65-F5344CB8AC3E}">
@@ -11143,7 +11303,7 @@
           <a:p>
             <a:r>
               <a:rPr lang="en-IN" dirty="0"/>
-              <a:t>Automated detection of ovarian cancer cells from nuclear morphology images with highest possible accuracy and speed, but with a highly unbalanced and small dataset. </a:t>
+              <a:t>Automated detection of ovarian cancer cells from nuclear morphology images with highest possible accuracy and speed, but with a highly imbalanced and small dataset. </a:t>
             </a:r>
           </a:p>
           <a:p>
@@ -11170,7 +11330,7 @@
           <p:nvPr/>
         </p:nvPicPr>
         <p:blipFill>
-          <a:blip r:embed="rId2">
+          <a:blip r:embed="rId3">
             <a:extLst>
               <a:ext uri="{28A0092B-C50C-407E-A947-70E740481C1C}">
                 <a14:useLocalDpi xmlns:a14="http://schemas.microsoft.com/office/drawing/2010/main" val="0"/>
@@ -11206,7 +11366,7 @@
           <p:nvPr/>
         </p:nvPicPr>
         <p:blipFill>
-          <a:blip r:embed="rId3"/>
+          <a:blip r:embed="rId4"/>
           <a:stretch>
             <a:fillRect/>
           </a:stretch>
@@ -11246,7 +11406,7 @@
           <p:nvPr/>
         </p:nvPicPr>
         <p:blipFill>
-          <a:blip r:embed="rId4"/>
+          <a:blip r:embed="rId5"/>
           <a:stretch>
             <a:fillRect/>
           </a:stretch>
@@ -11550,7 +11710,15 @@
           <a:p>
             <a:r>
               <a:rPr lang="en-US" dirty="0"/>
-              <a:t>- When the image dataset is small and unbalanced, image processing and data up-sampling using Synthetic Minority Oversampling Technique (SMOTE), makes it easier for the models for auto feature extraction using DL</a:t>
+              <a:t>- When the image dataset is small </a:t>
+            </a:r>
+            <a:r>
+              <a:rPr lang="en-US"/>
+              <a:t>and imbalanced</a:t>
+            </a:r>
+            <a:r>
+              <a:rPr lang="en-US" dirty="0"/>
+              <a:t>, image processing and data up-sampling using Synthetic Minority Oversampling Technique (SMOTE), makes it easier for the models for auto feature extraction using DL</a:t>
             </a:r>
           </a:p>
         </p:txBody>
@@ -12473,7 +12641,7 @@
           <p:nvPr>
             <p:extLst>
               <p:ext uri="{D42A27DB-BD31-4B8C-83A1-F6EECF244321}">
-                <p14:modId xmlns:p14="http://schemas.microsoft.com/office/powerpoint/2010/main" val="1374872750"/>
+                <p14:modId xmlns:p14="http://schemas.microsoft.com/office/powerpoint/2010/main" val="1400893301"/>
               </p:ext>
             </p:extLst>
           </p:nvPr>
@@ -12627,7 +12795,7 @@
                           <a:latin typeface="Aparajita" panose="02020603050405020304" pitchFamily="18" charset="0"/>
                           <a:cs typeface="Aparajita" panose="02020603050405020304" pitchFamily="18" charset="0"/>
                         </a:rPr>
-                        <a:t>0.99</a:t>
+                        <a:t>0.96</a:t>
                       </a:r>
                     </a:p>
                   </a:txBody>
@@ -12713,7 +12881,7 @@
                           <a:latin typeface="Aparajita" panose="02020603050405020304" pitchFamily="18" charset="0"/>
                           <a:cs typeface="Aparajita" panose="02020603050405020304" pitchFamily="18" charset="0"/>
                         </a:rPr>
-                        <a:t>0.99</a:t>
+                        <a:t>0.96</a:t>
                       </a:r>
                     </a:p>
                   </a:txBody>
@@ -13271,7 +13439,7 @@
             <a:pPr algn="just"/>
             <a:r>
               <a:rPr lang="en-US" dirty="0"/>
-              <a:t>Currently, I am leading the Data Science team at West Pharmaceutical Services and previously worked in Microsoft and well seasoned in domains such as Machine Learning, Deep Learning, Internet of Things (IoT), Robotics and Cloud Computing. In the Data Science domain,  I am well experienced with Computer Vision,  Time-Series Forecasting, NLP, Speech analysis. </a:t>
+              <a:t>Currently, I am leading the Data Science and AI team at West Pharmaceutical Services and previously worked in Microsoft and well seasoned in domains such as Machine Learning, Deep Learning, Internet of Things (IoT), Robotics and Cloud Computing. In the Data Science domain,  I am well experienced with Computer Vision,  Time-Series Forecasting, NLP, Speech analysis. </a:t>
             </a:r>
           </a:p>
           <a:p>
@@ -21419,8 +21587,8 @@
           <a:p>
             <a:pPr algn="ctr"/>
             <a:r>
-              <a:rPr lang="en-US" dirty="0"/>
-              <a:t>CNN</a:t>
+              <a:rPr lang="en-US" sz="1600" dirty="0"/>
+              <a:t>1D CNN</a:t>
             </a:r>
           </a:p>
         </p:txBody>
@@ -23247,7 +23415,7 @@
           <a:p>
             <a:r>
               <a:rPr lang="en-US" sz="1400" dirty="0"/>
-              <a:t>Feature Extraction using CNN + LSTM</a:t>
+              <a:t>Feature Extraction using 1D CNN + LSTM</a:t>
             </a:r>
           </a:p>
         </p:txBody>

</xml_diff>